<commit_message>
Added a lot on inductor design
</commit_message>
<xml_diff>
--- a/figures/IPEC_Figures_PowerPoint.pptx
+++ b/figures/IPEC_Figures_PowerPoint.pptx
@@ -5,10 +5,11 @@
     <p:sldMasterId id="2147483648" r:id="rId1"/>
   </p:sldMasterIdLst>
   <p:notesMasterIdLst>
-    <p:notesMasterId r:id="rId3"/>
+    <p:notesMasterId r:id="rId4"/>
   </p:notesMasterIdLst>
   <p:sldIdLst>
     <p:sldId id="610" r:id="rId2"/>
+    <p:sldId id="619" r:id="rId3"/>
   </p:sldIdLst>
   <p:sldSz cx="12192000" cy="6858000"/>
   <p:notesSz cx="6858000" cy="9144000"/>
@@ -573,6 +574,127 @@
 </p:notes>
 </file>
 
+<file path=ppt/notesSlides/notesSlide2.xml><?xml version="1.0" encoding="utf-8"?>
+<p:notes xmlns:a="http://schemas.openxmlformats.org/drawingml/2006/main" xmlns:r="http://schemas.openxmlformats.org/officeDocument/2006/relationships" xmlns:p="http://schemas.openxmlformats.org/presentationml/2006/main">
+  <p:cSld>
+    <p:spTree>
+      <p:nvGrpSpPr>
+        <p:cNvPr id="1" name="">
+          <a:extLst>
+            <a:ext uri="{FF2B5EF4-FFF2-40B4-BE49-F238E27FC236}">
+              <a16:creationId xmlns:a16="http://schemas.microsoft.com/office/drawing/2014/main" id="{BC90FFA4-0949-AC74-E431-2247EF86B35F}"/>
+            </a:ext>
+          </a:extLst>
+        </p:cNvPr>
+        <p:cNvGrpSpPr/>
+        <p:nvPr/>
+      </p:nvGrpSpPr>
+      <p:grpSpPr>
+        <a:xfrm>
+          <a:off x="0" y="0"/>
+          <a:ext cx="0" cy="0"/>
+          <a:chOff x="0" y="0"/>
+          <a:chExt cx="0" cy="0"/>
+        </a:xfrm>
+      </p:grpSpPr>
+      <p:sp>
+        <p:nvSpPr>
+          <p:cNvPr id="2" name="Slide Image Placeholder 1">
+            <a:extLst>
+              <a:ext uri="{FF2B5EF4-FFF2-40B4-BE49-F238E27FC236}">
+                <a16:creationId xmlns:a16="http://schemas.microsoft.com/office/drawing/2014/main" id="{D63CFB81-0937-AB08-F845-FE7C8821FCC7}"/>
+              </a:ext>
+            </a:extLst>
+          </p:cNvPr>
+          <p:cNvSpPr>
+            <a:spLocks noGrp="1" noRot="1" noChangeAspect="1"/>
+          </p:cNvSpPr>
+          <p:nvPr>
+            <p:ph type="sldImg"/>
+          </p:nvPr>
+        </p:nvSpPr>
+        <p:spPr/>
+      </p:sp>
+      <p:sp>
+        <p:nvSpPr>
+          <p:cNvPr id="3" name="Notes Placeholder 2">
+            <a:extLst>
+              <a:ext uri="{FF2B5EF4-FFF2-40B4-BE49-F238E27FC236}">
+                <a16:creationId xmlns:a16="http://schemas.microsoft.com/office/drawing/2014/main" id="{3B2BA4A6-C31B-0F47-3915-2C3996CB571A}"/>
+              </a:ext>
+            </a:extLst>
+          </p:cNvPr>
+          <p:cNvSpPr>
+            <a:spLocks noGrp="1"/>
+          </p:cNvSpPr>
+          <p:nvPr>
+            <p:ph type="body" idx="1"/>
+          </p:nvPr>
+        </p:nvSpPr>
+        <p:spPr/>
+        <p:txBody>
+          <a:bodyPr/>
+          <a:lstStyle/>
+          <a:p>
+            <a:pPr marL="342900" indent="-342900">
+              <a:lnSpc>
+                <a:spcPct val="150000"/>
+              </a:lnSpc>
+              <a:buFont typeface="Arial" panose="020B0604020202020204" pitchFamily="34" charset="0"/>
+              <a:buChar char="•"/>
+            </a:pPr>
+            <a:endParaRPr lang="en-US" dirty="0"/>
+          </a:p>
+        </p:txBody>
+      </p:sp>
+      <p:sp>
+        <p:nvSpPr>
+          <p:cNvPr id="4" name="Slide Number Placeholder 3">
+            <a:extLst>
+              <a:ext uri="{FF2B5EF4-FFF2-40B4-BE49-F238E27FC236}">
+                <a16:creationId xmlns:a16="http://schemas.microsoft.com/office/drawing/2014/main" id="{C7E1D7FC-4E4C-546D-D2FE-AC593292E403}"/>
+              </a:ext>
+            </a:extLst>
+          </p:cNvPr>
+          <p:cNvSpPr>
+            <a:spLocks noGrp="1"/>
+          </p:cNvSpPr>
+          <p:nvPr>
+            <p:ph type="sldNum" sz="quarter" idx="5"/>
+          </p:nvPr>
+        </p:nvSpPr>
+        <p:spPr/>
+        <p:txBody>
+          <a:bodyPr/>
+          <a:lstStyle/>
+          <a:p>
+            <a:pPr>
+              <a:defRPr/>
+            </a:pPr>
+            <a:fld id="{00AFC6D0-44D5-4EB7-828F-6F464F83D79A}" type="slidenum">
+              <a:rPr lang="en-GB" smtClean="0"/>
+              <a:pPr>
+                <a:defRPr/>
+              </a:pPr>
+              <a:t>2</a:t>
+            </a:fld>
+            <a:endParaRPr lang="en-GB"/>
+          </a:p>
+        </p:txBody>
+      </p:sp>
+    </p:spTree>
+    <p:extLst>
+      <p:ext uri="{BB962C8B-B14F-4D97-AF65-F5344CB8AC3E}">
+        <p14:creationId xmlns:p14="http://schemas.microsoft.com/office/powerpoint/2010/main" val="3030089213"/>
+      </p:ext>
+    </p:extLst>
+  </p:cSld>
+  <p:clrMapOvr>
+    <a:masterClrMapping/>
+  </p:clrMapOvr>
+</p:notes>
+</file>
+
 <file path=ppt/slideLayouts/slideLayout1.xml><?xml version="1.0" encoding="utf-8"?>
 <p:sldLayout xmlns:a="http://schemas.openxmlformats.org/drawingml/2006/main" xmlns:r="http://schemas.openxmlformats.org/officeDocument/2006/relationships" xmlns:p="http://schemas.openxmlformats.org/presentationml/2006/main" type="title" preserve="1">
   <p:cSld name="Titelfolie">
@@ -10548,6 +10670,367 @@
     <p:extLst>
       <p:ext uri="{BB962C8B-B14F-4D97-AF65-F5344CB8AC3E}">
         <p14:creationId xmlns:p14="http://schemas.microsoft.com/office/powerpoint/2010/main" val="3706583335"/>
+      </p:ext>
+    </p:extLst>
+  </p:cSld>
+  <p:clrMapOvr>
+    <a:masterClrMapping/>
+  </p:clrMapOvr>
+  <p:transition spd="slow"/>
+</p:sld>
+</file>
+
+<file path=ppt/slides/slide2.xml><?xml version="1.0" encoding="utf-8"?>
+<p:sld xmlns:a="http://schemas.openxmlformats.org/drawingml/2006/main" xmlns:r="http://schemas.openxmlformats.org/officeDocument/2006/relationships" xmlns:p="http://schemas.openxmlformats.org/presentationml/2006/main">
+  <p:cSld>
+    <p:spTree>
+      <p:nvGrpSpPr>
+        <p:cNvPr id="1" name="">
+          <a:extLst>
+            <a:ext uri="{FF2B5EF4-FFF2-40B4-BE49-F238E27FC236}">
+              <a16:creationId xmlns:a16="http://schemas.microsoft.com/office/drawing/2014/main" id="{0965B44C-F3A1-B0CF-FDB0-039688B9458E}"/>
+            </a:ext>
+          </a:extLst>
+        </p:cNvPr>
+        <p:cNvGrpSpPr/>
+        <p:nvPr/>
+      </p:nvGrpSpPr>
+      <p:grpSpPr>
+        <a:xfrm>
+          <a:off x="0" y="0"/>
+          <a:ext cx="0" cy="0"/>
+          <a:chOff x="0" y="0"/>
+          <a:chExt cx="0" cy="0"/>
+        </a:xfrm>
+      </p:grpSpPr>
+      <p:sp>
+        <p:nvSpPr>
+          <p:cNvPr id="3" name="Foliennummernplatzhalter 2">
+            <a:extLst>
+              <a:ext uri="{FF2B5EF4-FFF2-40B4-BE49-F238E27FC236}">
+                <a16:creationId xmlns:a16="http://schemas.microsoft.com/office/drawing/2014/main" id="{F032765D-CA93-206C-7148-764C577C047A}"/>
+              </a:ext>
+            </a:extLst>
+          </p:cNvPr>
+          <p:cNvSpPr>
+            <a:spLocks noGrp="1"/>
+          </p:cNvSpPr>
+          <p:nvPr>
+            <p:ph type="sldNum" sz="quarter" idx="11"/>
+          </p:nvPr>
+        </p:nvSpPr>
+        <p:spPr/>
+        <p:txBody>
+          <a:bodyPr/>
+          <a:lstStyle/>
+          <a:p>
+            <a:fld id="{CE58CB1E-F828-4F11-99E0-327109AF9DA4}" type="slidenum">
+              <a:rPr lang="de-DE" smtClean="0"/>
+              <a:pPr/>
+              <a:t>2</a:t>
+            </a:fld>
+            <a:endParaRPr lang="de-DE" dirty="0"/>
+          </a:p>
+        </p:txBody>
+      </p:sp>
+      <p:sp>
+        <p:nvSpPr>
+          <p:cNvPr id="4" name="Fußzeilenplatzhalter 3">
+            <a:extLst>
+              <a:ext uri="{FF2B5EF4-FFF2-40B4-BE49-F238E27FC236}">
+                <a16:creationId xmlns:a16="http://schemas.microsoft.com/office/drawing/2014/main" id="{2339288F-87FB-7F54-601D-E2D16E1B1478}"/>
+              </a:ext>
+            </a:extLst>
+          </p:cNvPr>
+          <p:cNvSpPr>
+            <a:spLocks noGrp="1"/>
+          </p:cNvSpPr>
+          <p:nvPr>
+            <p:ph type="ftr" sz="quarter" idx="12"/>
+          </p:nvPr>
+        </p:nvSpPr>
+        <p:spPr>
+          <a:xfrm>
+            <a:off x="414881" y="6466720"/>
+            <a:ext cx="8619040" cy="365125"/>
+          </a:xfrm>
+        </p:spPr>
+        <p:txBody>
+          <a:bodyPr/>
+          <a:lstStyle/>
+          <a:p>
+            <a:r>
+              <a:rPr lang="en-US"/>
+              <a:t>B.Sc. Adrian Keil (TUM) | Meeting 16.01.2025</a:t>
+            </a:r>
+            <a:endParaRPr lang="en-US" dirty="0"/>
+          </a:p>
+        </p:txBody>
+      </p:sp>
+      <p:pic>
+        <p:nvPicPr>
+          <p:cNvPr id="13" name="Grafik 12">
+            <a:extLst>
+              <a:ext uri="{FF2B5EF4-FFF2-40B4-BE49-F238E27FC236}">
+                <a16:creationId xmlns:a16="http://schemas.microsoft.com/office/drawing/2014/main" id="{05A97874-C888-2BC6-1D40-A94AD95F01F3}"/>
+              </a:ext>
+            </a:extLst>
+          </p:cNvPr>
+          <p:cNvPicPr>
+            <a:picLocks noChangeAspect="1"/>
+          </p:cNvPicPr>
+          <p:nvPr/>
+        </p:nvPicPr>
+        <p:blipFill>
+          <a:blip r:embed="rId3"/>
+          <a:srcRect l="21918" t="22251" r="1105" b="23617"/>
+          <a:stretch/>
+        </p:blipFill>
+        <p:spPr>
+          <a:xfrm>
+            <a:off x="115963" y="107950"/>
+            <a:ext cx="4006851" cy="2025650"/>
+          </a:xfrm>
+          <a:prstGeom prst="rect">
+            <a:avLst/>
+          </a:prstGeom>
+        </p:spPr>
+      </p:pic>
+      <p:sp>
+        <p:nvSpPr>
+          <p:cNvPr id="21" name="Textfeld 20">
+            <a:extLst>
+              <a:ext uri="{FF2B5EF4-FFF2-40B4-BE49-F238E27FC236}">
+                <a16:creationId xmlns:a16="http://schemas.microsoft.com/office/drawing/2014/main" id="{4E47C0FB-8A01-2B37-C5DD-0023E3CE7157}"/>
+              </a:ext>
+            </a:extLst>
+          </p:cNvPr>
+          <p:cNvSpPr txBox="1"/>
+          <p:nvPr/>
+        </p:nvSpPr>
+        <p:spPr>
+          <a:xfrm>
+            <a:off x="414881" y="6048892"/>
+            <a:ext cx="5205256" cy="356380"/>
+          </a:xfrm>
+          <a:prstGeom prst="rect">
+            <a:avLst/>
+          </a:prstGeom>
+          <a:noFill/>
+        </p:spPr>
+        <p:txBody>
+          <a:bodyPr wrap="square" lIns="0" tIns="0" rIns="0" bIns="0" rtlCol="0">
+            <a:spAutoFit/>
+          </a:bodyPr>
+          <a:lstStyle/>
+          <a:p>
+            <a:pPr>
+              <a:lnSpc>
+                <a:spcPct val="114000"/>
+              </a:lnSpc>
+            </a:pPr>
+            <a:r>
+              <a:rPr lang="de-DE" sz="2133" dirty="0"/>
+              <a:t>Field </a:t>
+            </a:r>
+            <a:r>
+              <a:rPr lang="de-DE" sz="2133" dirty="0" err="1"/>
+              <a:t>intensity</a:t>
+            </a:r>
+            <a:r>
+              <a:rPr lang="de-DE" sz="2133" dirty="0"/>
+              <a:t> (0 – 10 kA/m)</a:t>
+            </a:r>
+          </a:p>
+        </p:txBody>
+      </p:sp>
+      <p:sp>
+        <p:nvSpPr>
+          <p:cNvPr id="22" name="Textfeld 21">
+            <a:extLst>
+              <a:ext uri="{FF2B5EF4-FFF2-40B4-BE49-F238E27FC236}">
+                <a16:creationId xmlns:a16="http://schemas.microsoft.com/office/drawing/2014/main" id="{C5449017-B18F-2FE1-ECAF-746779F270FB}"/>
+              </a:ext>
+            </a:extLst>
+          </p:cNvPr>
+          <p:cNvSpPr txBox="1"/>
+          <p:nvPr/>
+        </p:nvSpPr>
+        <p:spPr>
+          <a:xfrm>
+            <a:off x="5733897" y="6048820"/>
+            <a:ext cx="5205256" cy="356380"/>
+          </a:xfrm>
+          <a:prstGeom prst="rect">
+            <a:avLst/>
+          </a:prstGeom>
+          <a:noFill/>
+        </p:spPr>
+        <p:txBody>
+          <a:bodyPr wrap="square" lIns="0" tIns="0" rIns="0" bIns="0" rtlCol="0">
+            <a:spAutoFit/>
+          </a:bodyPr>
+          <a:lstStyle/>
+          <a:p>
+            <a:pPr>
+              <a:lnSpc>
+                <a:spcPct val="114000"/>
+              </a:lnSpc>
+            </a:pPr>
+            <a:r>
+              <a:rPr lang="de-DE" sz="2133" dirty="0" err="1"/>
+              <a:t>Current</a:t>
+            </a:r>
+            <a:r>
+              <a:rPr lang="de-DE" sz="2133" dirty="0"/>
+              <a:t> </a:t>
+            </a:r>
+            <a:r>
+              <a:rPr lang="de-DE" sz="2133" dirty="0" err="1"/>
+              <a:t>density</a:t>
+            </a:r>
+            <a:r>
+              <a:rPr lang="de-DE" sz="2133" dirty="0"/>
+              <a:t> (0 – 300 A/mm^2)</a:t>
+            </a:r>
+          </a:p>
+        </p:txBody>
+      </p:sp>
+      <p:pic>
+        <p:nvPicPr>
+          <p:cNvPr id="2" name="Grafik 1">
+            <a:extLst>
+              <a:ext uri="{FF2B5EF4-FFF2-40B4-BE49-F238E27FC236}">
+                <a16:creationId xmlns:a16="http://schemas.microsoft.com/office/drawing/2014/main" id="{F347243D-50A9-BE30-0D13-565CBCBD1849}"/>
+              </a:ext>
+            </a:extLst>
+          </p:cNvPr>
+          <p:cNvPicPr>
+            <a:picLocks noChangeAspect="1"/>
+          </p:cNvPicPr>
+          <p:nvPr/>
+        </p:nvPicPr>
+        <p:blipFill>
+          <a:blip r:embed="rId4"/>
+          <a:stretch>
+            <a:fillRect/>
+          </a:stretch>
+        </p:blipFill>
+        <p:spPr>
+          <a:xfrm>
+            <a:off x="4253599" y="120093"/>
+            <a:ext cx="2960597" cy="1213632"/>
+          </a:xfrm>
+          <a:prstGeom prst="rect">
+            <a:avLst/>
+          </a:prstGeom>
+          <a:ln>
+            <a:noFill/>
+          </a:ln>
+          <a:effectLst/>
+        </p:spPr>
+      </p:pic>
+      <p:pic>
+        <p:nvPicPr>
+          <p:cNvPr id="7" name="Grafik 6">
+            <a:extLst>
+              <a:ext uri="{FF2B5EF4-FFF2-40B4-BE49-F238E27FC236}">
+                <a16:creationId xmlns:a16="http://schemas.microsoft.com/office/drawing/2014/main" id="{C590662D-46BC-F194-82B8-CC3D02A17CC6}"/>
+              </a:ext>
+            </a:extLst>
+          </p:cNvPr>
+          <p:cNvPicPr>
+            <a:picLocks noChangeAspect="1"/>
+          </p:cNvPicPr>
+          <p:nvPr/>
+        </p:nvPicPr>
+        <p:blipFill>
+          <a:blip r:embed="rId5"/>
+          <a:srcRect l="22358" t="23439" r="2287" b="22429"/>
+          <a:stretch/>
+        </p:blipFill>
+        <p:spPr>
+          <a:xfrm>
+            <a:off x="115963" y="2294673"/>
+            <a:ext cx="4006851" cy="1978690"/>
+          </a:xfrm>
+          <a:prstGeom prst="rect">
+            <a:avLst/>
+          </a:prstGeom>
+        </p:spPr>
+      </p:pic>
+      <p:pic>
+        <p:nvPicPr>
+          <p:cNvPr id="8" name="Grafik 7">
+            <a:extLst>
+              <a:ext uri="{FF2B5EF4-FFF2-40B4-BE49-F238E27FC236}">
+                <a16:creationId xmlns:a16="http://schemas.microsoft.com/office/drawing/2014/main" id="{5446A8CF-D853-4B5E-A449-071824347C69}"/>
+              </a:ext>
+            </a:extLst>
+          </p:cNvPr>
+          <p:cNvPicPr>
+            <a:picLocks noChangeAspect="1"/>
+          </p:cNvPicPr>
+          <p:nvPr/>
+        </p:nvPicPr>
+        <p:blipFill>
+          <a:blip r:embed="rId6"/>
+          <a:stretch>
+            <a:fillRect/>
+          </a:stretch>
+        </p:blipFill>
+        <p:spPr>
+          <a:xfrm>
+            <a:off x="4253597" y="1702380"/>
+            <a:ext cx="2960597" cy="1184585"/>
+          </a:xfrm>
+          <a:prstGeom prst="rect">
+            <a:avLst/>
+          </a:prstGeom>
+          <a:ln>
+            <a:noFill/>
+          </a:ln>
+          <a:effectLst/>
+        </p:spPr>
+      </p:pic>
+      <p:pic>
+        <p:nvPicPr>
+          <p:cNvPr id="11" name="Grafik 10">
+            <a:extLst>
+              <a:ext uri="{FF2B5EF4-FFF2-40B4-BE49-F238E27FC236}">
+                <a16:creationId xmlns:a16="http://schemas.microsoft.com/office/drawing/2014/main" id="{86C5EAB9-AD7F-D158-B45E-ABD1898F208D}"/>
+              </a:ext>
+            </a:extLst>
+          </p:cNvPr>
+          <p:cNvPicPr>
+            <a:picLocks noChangeAspect="1"/>
+          </p:cNvPicPr>
+          <p:nvPr/>
+        </p:nvPicPr>
+        <p:blipFill>
+          <a:blip r:embed="rId7"/>
+          <a:stretch>
+            <a:fillRect/>
+          </a:stretch>
+        </p:blipFill>
+        <p:spPr>
+          <a:xfrm>
+            <a:off x="4253598" y="3029885"/>
+            <a:ext cx="2960597" cy="1243478"/>
+          </a:xfrm>
+          <a:prstGeom prst="rect">
+            <a:avLst/>
+          </a:prstGeom>
+          <a:ln>
+            <a:noFill/>
+          </a:ln>
+          <a:effectLst/>
+        </p:spPr>
+      </p:pic>
+    </p:spTree>
+    <p:extLst>
+      <p:ext uri="{BB962C8B-B14F-4D97-AF65-F5344CB8AC3E}">
+        <p14:creationId xmlns:p14="http://schemas.microsoft.com/office/powerpoint/2010/main" val="4265521626"/>
       </p:ext>
     </p:extLst>
   </p:cSld>

</xml_diff>